<commit_message>
Change in gender slide title
</commit_message>
<xml_diff>
--- a/Project1 with titles.pptx
+++ b/Project1 with titles.pptx
@@ -128,6 +128,30 @@
 
 <file path=ppt/changesInfos/changesInfo1.xml><?xml version="1.0" encoding="utf-8"?>
 <pc:chgInfo xmlns:a="http://schemas.openxmlformats.org/drawingml/2006/main" xmlns:r="http://schemas.openxmlformats.org/officeDocument/2006/relationships" xmlns:ac="http://schemas.microsoft.com/office/drawing/2013/main/command" xmlns:pc="http://schemas.microsoft.com/office/powerpoint/2013/main/command">
+  <pc:docChgLst>
+    <pc:chgData name="Paul Friesenhahn" userId="f916021d3ee654ef" providerId="LiveId" clId="{F285AA3B-1A7E-42AB-876B-BBF89975ED5A}"/>
+    <pc:docChg chg="modSld">
+      <pc:chgData name="Paul Friesenhahn" userId="f916021d3ee654ef" providerId="LiveId" clId="{F285AA3B-1A7E-42AB-876B-BBF89975ED5A}" dt="2023-04-20T16:26:05.052" v="2" actId="108"/>
+      <pc:docMkLst>
+        <pc:docMk/>
+      </pc:docMkLst>
+      <pc:sldChg chg="modSp mod">
+        <pc:chgData name="Paul Friesenhahn" userId="f916021d3ee654ef" providerId="LiveId" clId="{F285AA3B-1A7E-42AB-876B-BBF89975ED5A}" dt="2023-04-20T16:26:05.052" v="2" actId="108"/>
+        <pc:sldMkLst>
+          <pc:docMk/>
+          <pc:sldMk cId="2460101852" sldId="262"/>
+        </pc:sldMkLst>
+        <pc:spChg chg="mod">
+          <ac:chgData name="Paul Friesenhahn" userId="f916021d3ee654ef" providerId="LiveId" clId="{F285AA3B-1A7E-42AB-876B-BBF89975ED5A}" dt="2023-04-20T16:26:05.052" v="2" actId="108"/>
+          <ac:spMkLst>
+            <pc:docMk/>
+            <pc:sldMk cId="2460101852" sldId="262"/>
+            <ac:spMk id="2" creationId="{93773CD5-AF86-E0CB-7EBA-01677019186B}"/>
+          </ac:spMkLst>
+        </pc:spChg>
+      </pc:sldChg>
+    </pc:docChg>
+  </pc:docChgLst>
   <pc:docChgLst>
     <pc:chgData name="Paul Friesenhahn" userId="f916021d3ee654ef" providerId="LiveId" clId="{C3AA7BDC-B3B0-443C-BC3A-4E07882F7006}"/>
     <pc:docChg chg="undo custSel addSld delSld modSld">
@@ -696,7 +720,7 @@
           <a:p>
             <a:fld id="{186C120C-5F30-49F4-9D5D-5CF6E6E16A02}" type="datetimeFigureOut">
               <a:rPr lang="en-US" smtClean="0"/>
-              <a:t>4/19/2023</a:t>
+              <a:t>4/20/2023</a:t>
             </a:fld>
             <a:endParaRPr lang="en-US"/>
           </a:p>
@@ -2150,7 +2174,7 @@
           <a:p>
             <a:fld id="{418062D4-BD81-47E8-8F35-E30EF70072D2}" type="datetimeFigureOut">
               <a:rPr lang="en-US" smtClean="0"/>
-              <a:t>4/19/2023</a:t>
+              <a:t>4/20/2023</a:t>
             </a:fld>
             <a:endParaRPr lang="en-US"/>
           </a:p>
@@ -2348,7 +2372,7 @@
           <a:p>
             <a:fld id="{418062D4-BD81-47E8-8F35-E30EF70072D2}" type="datetimeFigureOut">
               <a:rPr lang="en-US" smtClean="0"/>
-              <a:t>4/19/2023</a:t>
+              <a:t>4/20/2023</a:t>
             </a:fld>
             <a:endParaRPr lang="en-US"/>
           </a:p>
@@ -2556,7 +2580,7 @@
           <a:p>
             <a:fld id="{418062D4-BD81-47E8-8F35-E30EF70072D2}" type="datetimeFigureOut">
               <a:rPr lang="en-US" smtClean="0"/>
-              <a:t>4/19/2023</a:t>
+              <a:t>4/20/2023</a:t>
             </a:fld>
             <a:endParaRPr lang="en-US"/>
           </a:p>
@@ -2754,7 +2778,7 @@
           <a:p>
             <a:fld id="{418062D4-BD81-47E8-8F35-E30EF70072D2}" type="datetimeFigureOut">
               <a:rPr lang="en-US" smtClean="0"/>
-              <a:t>4/19/2023</a:t>
+              <a:t>4/20/2023</a:t>
             </a:fld>
             <a:endParaRPr lang="en-US"/>
           </a:p>
@@ -3029,7 +3053,7 @@
           <a:p>
             <a:fld id="{418062D4-BD81-47E8-8F35-E30EF70072D2}" type="datetimeFigureOut">
               <a:rPr lang="en-US" smtClean="0"/>
-              <a:t>4/19/2023</a:t>
+              <a:t>4/20/2023</a:t>
             </a:fld>
             <a:endParaRPr lang="en-US"/>
           </a:p>
@@ -3294,7 +3318,7 @@
           <a:p>
             <a:fld id="{418062D4-BD81-47E8-8F35-E30EF70072D2}" type="datetimeFigureOut">
               <a:rPr lang="en-US" smtClean="0"/>
-              <a:t>4/19/2023</a:t>
+              <a:t>4/20/2023</a:t>
             </a:fld>
             <a:endParaRPr lang="en-US"/>
           </a:p>
@@ -3706,7 +3730,7 @@
           <a:p>
             <a:fld id="{418062D4-BD81-47E8-8F35-E30EF70072D2}" type="datetimeFigureOut">
               <a:rPr lang="en-US" smtClean="0"/>
-              <a:t>4/19/2023</a:t>
+              <a:t>4/20/2023</a:t>
             </a:fld>
             <a:endParaRPr lang="en-US"/>
           </a:p>
@@ -3847,7 +3871,7 @@
           <a:p>
             <a:fld id="{418062D4-BD81-47E8-8F35-E30EF70072D2}" type="datetimeFigureOut">
               <a:rPr lang="en-US" smtClean="0"/>
-              <a:t>4/19/2023</a:t>
+              <a:t>4/20/2023</a:t>
             </a:fld>
             <a:endParaRPr lang="en-US"/>
           </a:p>
@@ -3960,7 +3984,7 @@
           <a:p>
             <a:fld id="{418062D4-BD81-47E8-8F35-E30EF70072D2}" type="datetimeFigureOut">
               <a:rPr lang="en-US" smtClean="0"/>
-              <a:t>4/19/2023</a:t>
+              <a:t>4/20/2023</a:t>
             </a:fld>
             <a:endParaRPr lang="en-US"/>
           </a:p>
@@ -4271,7 +4295,7 @@
           <a:p>
             <a:fld id="{418062D4-BD81-47E8-8F35-E30EF70072D2}" type="datetimeFigureOut">
               <a:rPr lang="en-US" smtClean="0"/>
-              <a:t>4/19/2023</a:t>
+              <a:t>4/20/2023</a:t>
             </a:fld>
             <a:endParaRPr lang="en-US"/>
           </a:p>
@@ -4559,7 +4583,7 @@
           <a:p>
             <a:fld id="{418062D4-BD81-47E8-8F35-E30EF70072D2}" type="datetimeFigureOut">
               <a:rPr lang="en-US" smtClean="0"/>
-              <a:t>4/19/2023</a:t>
+              <a:t>4/20/2023</a:t>
             </a:fld>
             <a:endParaRPr lang="en-US"/>
           </a:p>
@@ -4800,7 +4824,7 @@
           <a:p>
             <a:fld id="{418062D4-BD81-47E8-8F35-E30EF70072D2}" type="datetimeFigureOut">
               <a:rPr lang="en-US" smtClean="0"/>
-              <a:t>4/19/2023</a:t>
+              <a:t>4/20/2023</a:t>
             </a:fld>
             <a:endParaRPr lang="en-US"/>
           </a:p>
@@ -6502,7 +6526,7 @@
           <a:p>
             <a:r>
               <a:rPr lang="en-US" dirty="0"/>
-              <a:t>Does gender affect sleep?</a:t>
+              <a:t>Does age &amp; gender affects sleep efficiency &amp; sleep duration ?</a:t>
             </a:r>
           </a:p>
         </p:txBody>

</xml_diff>